<commit_message>
Update Präsentation, add Beispiel
</commit_message>
<xml_diff>
--- a/Präsentation Übung 2.5.pptx
+++ b/Präsentation Übung 2.5.pptx
@@ -9,16 +9,17 @@
     <p:sldMasterId id="2147483693" r:id="rId5"/>
   </p:sldMasterIdLst>
   <p:notesMasterIdLst>
-    <p:notesMasterId r:id="rId13"/>
+    <p:notesMasterId r:id="rId14"/>
   </p:notesMasterIdLst>
   <p:sldIdLst>
     <p:sldId id="261" r:id="rId6"/>
     <p:sldId id="258" r:id="rId7"/>
     <p:sldId id="260" r:id="rId8"/>
     <p:sldId id="262" r:id="rId9"/>
-    <p:sldId id="263" r:id="rId10"/>
-    <p:sldId id="264" r:id="rId11"/>
-    <p:sldId id="265" r:id="rId12"/>
+    <p:sldId id="266" r:id="rId10"/>
+    <p:sldId id="263" r:id="rId11"/>
+    <p:sldId id="264" r:id="rId12"/>
+    <p:sldId id="265" r:id="rId13"/>
   </p:sldIdLst>
   <p:sldSz cx="12192000" cy="6858000"/>
   <p:notesSz cx="6858000" cy="9144000"/>
@@ -268,7 +269,7 @@
           <a:p>
             <a:fld id="{028B6593-098D-4382-9647-35487FA190B4}" type="datetimeFigureOut">
               <a:rPr lang="de-DE" smtClean="0"/>
-              <a:t>18.10.2024</a:t>
+              <a:t>21.10.2024</a:t>
             </a:fld>
             <a:endParaRPr lang="de-DE"/>
           </a:p>
@@ -616,7 +617,7 @@
           <a:p>
             <a:fld id="{E6C9A274-C30D-43E2-800F-A784839DD805}" type="datetime4">
               <a:rPr lang="de-DE" smtClean="0"/>
-              <a:t>18. Oktober 2024</a:t>
+              <a:t>21. Oktober 2024</a:t>
             </a:fld>
             <a:endParaRPr lang="de-DE" dirty="0"/>
           </a:p>
@@ -1151,7 +1152,7 @@
           <a:p>
             <a:fld id="{F2EC1E49-4DF2-48D3-9934-687C5EF7E3B6}" type="datetime4">
               <a:rPr lang="de-DE" smtClean="0"/>
-              <a:t>18. Oktober 2024</a:t>
+              <a:t>21. Oktober 2024</a:t>
             </a:fld>
             <a:endParaRPr lang="de-DE" dirty="0"/>
           </a:p>
@@ -1646,7 +1647,7 @@
           <a:p>
             <a:fld id="{35466938-0CBB-4F88-B069-98E67B1BDB39}" type="datetime4">
               <a:rPr lang="de-DE" smtClean="0"/>
-              <a:t>18. Oktober 2024</a:t>
+              <a:t>21. Oktober 2024</a:t>
             </a:fld>
             <a:endParaRPr lang="de-DE" dirty="0"/>
           </a:p>
@@ -2181,7 +2182,7 @@
           <a:p>
             <a:fld id="{8474AA83-B208-4B3C-ADFB-92BACFB9D3B0}" type="datetime4">
               <a:rPr lang="de-DE" smtClean="0"/>
-              <a:t>18. Oktober 2024</a:t>
+              <a:t>21. Oktober 2024</a:t>
             </a:fld>
             <a:endParaRPr lang="de-DE" dirty="0"/>
           </a:p>
@@ -2676,7 +2677,7 @@
           <a:p>
             <a:fld id="{32A2DF26-52BD-4D71-BE94-606B5153C43C}" type="datetime4">
               <a:rPr lang="de-DE" smtClean="0"/>
-              <a:t>18. Oktober 2024</a:t>
+              <a:t>21. Oktober 2024</a:t>
             </a:fld>
             <a:endParaRPr lang="de-DE" dirty="0"/>
           </a:p>
@@ -3211,7 +3212,7 @@
           <a:p>
             <a:fld id="{0450DA4D-4244-4562-98C9-890731B3CB69}" type="datetime4">
               <a:rPr lang="de-DE" smtClean="0"/>
-              <a:t>18. Oktober 2024</a:t>
+              <a:t>21. Oktober 2024</a:t>
             </a:fld>
             <a:endParaRPr lang="de-DE" dirty="0"/>
           </a:p>
@@ -3750,7 +3751,7 @@
           <a:p>
             <a:fld id="{13492B8E-210E-4492-9BD5-66D89A088164}" type="datetime4">
               <a:rPr lang="de-DE" smtClean="0"/>
-              <a:t>18. Oktober 2024</a:t>
+              <a:t>21. Oktober 2024</a:t>
             </a:fld>
             <a:endParaRPr lang="de-DE" dirty="0"/>
           </a:p>
@@ -4420,7 +4421,7 @@
           <a:p>
             <a:fld id="{483434E0-B671-4BA0-91BF-41BD4B09EB0B}" type="datetime4">
               <a:rPr lang="de-DE" smtClean="0"/>
-              <a:t>18. Oktober 2024</a:t>
+              <a:t>21. Oktober 2024</a:t>
             </a:fld>
             <a:endParaRPr lang="de-DE" dirty="0"/>
           </a:p>
@@ -4955,7 +4956,7 @@
           <a:p>
             <a:fld id="{064C25BF-9E8D-4A0D-8D1F-DFFDE78B3A10}" type="datetime4">
               <a:rPr lang="de-DE" smtClean="0"/>
-              <a:t>18. Oktober 2024</a:t>
+              <a:t>21. Oktober 2024</a:t>
             </a:fld>
             <a:endParaRPr lang="de-DE" dirty="0"/>
           </a:p>
@@ -5450,7 +5451,7 @@
           <a:p>
             <a:fld id="{E1EE2351-7215-4B1B-8EDC-56EFF5F79941}" type="datetime4">
               <a:rPr lang="de-DE" smtClean="0"/>
-              <a:t>18. Oktober 2024</a:t>
+              <a:t>21. Oktober 2024</a:t>
             </a:fld>
             <a:endParaRPr lang="de-DE" dirty="0"/>
           </a:p>
@@ -9450,7 +9451,7 @@
           <a:p>
             <a:fld id="{E8F88F07-0C73-4A42-93C3-796859F17C4F}" type="datetime4">
               <a:rPr lang="de-DE" smtClean="0"/>
-              <a:t>18. Oktober 2024</a:t>
+              <a:t>21. Oktober 2024</a:t>
             </a:fld>
             <a:endParaRPr lang="de-DE" dirty="0"/>
           </a:p>
@@ -10589,6 +10590,797 @@
 </file>
 
 <file path=ppt/slides/slide5.xml><?xml version="1.0" encoding="utf-8"?>
+<p:sld xmlns:a="http://schemas.openxmlformats.org/drawingml/2006/main" xmlns:r="http://schemas.openxmlformats.org/officeDocument/2006/relationships" xmlns:p="http://schemas.openxmlformats.org/presentationml/2006/main">
+  <p:cSld>
+    <p:spTree>
+      <p:nvGrpSpPr>
+        <p:cNvPr id="1" name=""/>
+        <p:cNvGrpSpPr/>
+        <p:nvPr/>
+      </p:nvGrpSpPr>
+      <p:grpSpPr>
+        <a:xfrm>
+          <a:off x="0" y="0"/>
+          <a:ext cx="0" cy="0"/>
+          <a:chOff x="0" y="0"/>
+          <a:chExt cx="0" cy="0"/>
+        </a:xfrm>
+      </p:grpSpPr>
+      <p:sp>
+        <p:nvSpPr>
+          <p:cNvPr id="2" name="Titel 1">
+            <a:extLst>
+              <a:ext uri="{FF2B5EF4-FFF2-40B4-BE49-F238E27FC236}">
+                <a16:creationId xmlns:a16="http://schemas.microsoft.com/office/drawing/2014/main" id="{6D14069B-64A7-6FEF-9B8F-160FE57C8110}"/>
+              </a:ext>
+            </a:extLst>
+          </p:cNvPr>
+          <p:cNvSpPr>
+            <a:spLocks noGrp="1"/>
+          </p:cNvSpPr>
+          <p:nvPr>
+            <p:ph type="title"/>
+          </p:nvPr>
+        </p:nvSpPr>
+        <p:spPr/>
+        <p:txBody>
+          <a:bodyPr/>
+          <a:lstStyle/>
+          <a:p>
+            <a:r>
+              <a:rPr lang="en-GB" dirty="0" err="1">
+                <a:latin typeface="Aptos" panose="020B0004020202020204" pitchFamily="34" charset="0"/>
+              </a:rPr>
+              <a:t>Beispiel</a:t>
+            </a:r>
+            <a:endParaRPr lang="en-DE" dirty="0">
+              <a:latin typeface="Aptos" panose="020B0004020202020204" pitchFamily="34" charset="0"/>
+            </a:endParaRPr>
+          </a:p>
+        </p:txBody>
+      </p:sp>
+      <mc:AlternateContent xmlns:mc="http://schemas.openxmlformats.org/markup-compatibility/2006">
+        <mc:Choice xmlns:a14="http://schemas.microsoft.com/office/drawing/2010/main" Requires="a14">
+          <p:sp>
+            <p:nvSpPr>
+              <p:cNvPr id="3" name="Inhaltsplatzhalter 2">
+                <a:extLst>
+                  <a:ext uri="{FF2B5EF4-FFF2-40B4-BE49-F238E27FC236}">
+                    <a16:creationId xmlns:a16="http://schemas.microsoft.com/office/drawing/2014/main" id="{B81F428C-F31D-8A16-F508-C7E947677A17}"/>
+                  </a:ext>
+                </a:extLst>
+              </p:cNvPr>
+              <p:cNvSpPr>
+                <a:spLocks noGrp="1"/>
+              </p:cNvSpPr>
+              <p:nvPr>
+                <p:ph idx="1"/>
+              </p:nvPr>
+            </p:nvSpPr>
+            <p:spPr/>
+            <p:txBody>
+              <a:bodyPr/>
+              <a:lstStyle/>
+              <a:p>
+                <a:pPr marL="285750" indent="-285750">
+                  <a:buFont typeface="Arial" panose="020B0604020202020204" pitchFamily="34" charset="0"/>
+                  <a:buChar char="•"/>
+                </a:pPr>
+                <a:r>
+                  <a:rPr lang="en-GB" sz="2800" b="0" dirty="0">
+                    <a:latin typeface="Aptos" panose="020B0004020202020204" pitchFamily="34" charset="0"/>
+                  </a:rPr>
+                  <a:t>n = 12</a:t>
+                </a:r>
+              </a:p>
+              <a:p>
+                <a:pPr marL="465750" lvl="2" indent="-285750">
+                  <a:buFont typeface="Arial" panose="020B0604020202020204" pitchFamily="34" charset="0"/>
+                  <a:buChar char="•"/>
+                </a:pPr>
+                <a:r>
+                  <a:rPr lang="en-GB" sz="2800" dirty="0" err="1">
+                    <a:latin typeface="Aptos" panose="020B0004020202020204" pitchFamily="34" charset="0"/>
+                  </a:rPr>
+                  <a:t>Faktoren</a:t>
+                </a:r>
+                <a:r>
+                  <a:rPr lang="en-GB" sz="2800" dirty="0">
+                    <a:latin typeface="Aptos" panose="020B0004020202020204" pitchFamily="34" charset="0"/>
+                  </a:rPr>
+                  <a:t>: </a:t>
+                </a:r>
+                <a14:m>
+                  <m:oMath xmlns:m="http://schemas.openxmlformats.org/officeDocument/2006/math">
+                    <m:r>
+                      <a:rPr lang="en-GB" sz="2800" b="0" i="1" smtClean="0">
+                        <a:latin typeface="Cambria Math" panose="02040503050406030204" pitchFamily="18" charset="0"/>
+                      </a:rPr>
+                      <m:t>1∗12, 2∗6, 3∗4, 4∗3, 6∗2, 12∗1</m:t>
+                    </m:r>
+                  </m:oMath>
+                </a14:m>
+                <a:endParaRPr lang="en-GB" sz="2800" b="0" dirty="0">
+                  <a:latin typeface="Aptos" panose="020B0004020202020204" pitchFamily="34" charset="0"/>
+                </a:endParaRPr>
+              </a:p>
+              <a:p>
+                <a:pPr marL="465750" lvl="2" indent="-285750">
+                  <a:buFont typeface="Arial" panose="020B0604020202020204" pitchFamily="34" charset="0"/>
+                  <a:buChar char="•"/>
+                </a:pPr>
+                <a:r>
+                  <a:rPr lang="en-GB" sz="2800" b="0" dirty="0">
+                    <a:latin typeface="Aptos" panose="020B0004020202020204" pitchFamily="34" charset="0"/>
+                  </a:rPr>
+                  <a:t>√12 = 3,464102… </a:t>
+                </a:r>
+              </a:p>
+              <a:p>
+                <a:pPr marL="465750" lvl="2" indent="-285750">
+                  <a:buFont typeface="Arial" panose="020B0604020202020204" pitchFamily="34" charset="0"/>
+                  <a:buChar char="•"/>
+                </a:pPr>
+                <a:r>
+                  <a:rPr lang="en-GB" sz="2800" b="0" dirty="0">
+                    <a:latin typeface="Aptos" panose="020B0004020202020204" pitchFamily="34" charset="0"/>
+                  </a:rPr>
+                  <a:t>(</a:t>
+                </a:r>
+                <a:r>
+                  <a:rPr lang="en-GB" sz="2800" b="0" dirty="0" err="1">
+                    <a:latin typeface="Aptos" panose="020B0004020202020204" pitchFamily="34" charset="0"/>
+                  </a:rPr>
+                  <a:t>aufgerundet</a:t>
+                </a:r>
+                <a:r>
+                  <a:rPr lang="en-GB" sz="2800" b="0" dirty="0">
+                    <a:latin typeface="Aptos" panose="020B0004020202020204" pitchFamily="34" charset="0"/>
+                  </a:rPr>
+                  <a:t> 4)</a:t>
+                </a:r>
+              </a:p>
+              <a:p>
+                <a:pPr marL="637200" lvl="2" indent="-457200">
+                  <a:buFont typeface="Wingdings" panose="05000000000000000000" pitchFamily="2" charset="2"/>
+                  <a:buChar char="Ø"/>
+                </a:pPr>
+                <a:r>
+                  <a:rPr lang="en-GB" sz="2800" dirty="0">
+                    <a:latin typeface="Aptos" panose="020B0004020202020204" pitchFamily="34" charset="0"/>
+                  </a:rPr>
+                  <a:t>Ab der Wurzel von n “</a:t>
+                </a:r>
+                <a:r>
+                  <a:rPr lang="en-GB" sz="2800" dirty="0" err="1">
+                    <a:latin typeface="Aptos" panose="020B0004020202020204" pitchFamily="34" charset="0"/>
+                  </a:rPr>
+                  <a:t>wiederholen</a:t>
+                </a:r>
+                <a:r>
+                  <a:rPr lang="en-GB" sz="2800" dirty="0">
+                    <a:latin typeface="Aptos" panose="020B0004020202020204" pitchFamily="34" charset="0"/>
+                  </a:rPr>
+                  <a:t>” </a:t>
+                </a:r>
+                <a:r>
+                  <a:rPr lang="en-GB" sz="2800" dirty="0" err="1">
+                    <a:latin typeface="Aptos" panose="020B0004020202020204" pitchFamily="34" charset="0"/>
+                  </a:rPr>
+                  <a:t>sich</a:t>
+                </a:r>
+                <a:r>
+                  <a:rPr lang="en-GB" sz="2800" dirty="0">
+                    <a:latin typeface="Aptos" panose="020B0004020202020204" pitchFamily="34" charset="0"/>
+                  </a:rPr>
+                  <a:t> die </a:t>
+                </a:r>
+                <a:r>
+                  <a:rPr lang="en-GB" sz="2800" dirty="0" err="1">
+                    <a:latin typeface="Aptos" panose="020B0004020202020204" pitchFamily="34" charset="0"/>
+                  </a:rPr>
+                  <a:t>Faktorenpaare</a:t>
+                </a:r>
+                <a:endParaRPr lang="en-GB" sz="2800" b="0" dirty="0">
+                  <a:latin typeface="Aptos" panose="020B0004020202020204" pitchFamily="34" charset="0"/>
+                </a:endParaRPr>
+              </a:p>
+              <a:p>
+                <a:pPr marL="465750" lvl="2" indent="-285750">
+                  <a:buFont typeface="Arial" panose="020B0604020202020204" pitchFamily="34" charset="0"/>
+                  <a:buChar char="•"/>
+                </a:pPr>
+                <a:endParaRPr lang="en-DE" sz="2800" b="0" dirty="0">
+                  <a:latin typeface="Aptos" panose="020B0004020202020204" pitchFamily="34" charset="0"/>
+                </a:endParaRPr>
+              </a:p>
+            </p:txBody>
+          </p:sp>
+        </mc:Choice>
+        <mc:Fallback>
+          <p:sp>
+            <p:nvSpPr>
+              <p:cNvPr id="3" name="Inhaltsplatzhalter 2">
+                <a:extLst>
+                  <a:ext uri="{FF2B5EF4-FFF2-40B4-BE49-F238E27FC236}">
+                    <a16:creationId xmlns:a16="http://schemas.microsoft.com/office/drawing/2014/main" id="{B81F428C-F31D-8A16-F508-C7E947677A17}"/>
+                  </a:ext>
+                </a:extLst>
+              </p:cNvPr>
+              <p:cNvSpPr>
+                <a:spLocks noGrp="1" noRot="1" noChangeAspect="1" noMove="1" noResize="1" noEditPoints="1" noAdjustHandles="1" noChangeArrowheads="1" noChangeShapeType="1" noTextEdit="1"/>
+              </p:cNvSpPr>
+              <p:nvPr>
+                <p:ph idx="1"/>
+              </p:nvPr>
+            </p:nvSpPr>
+            <p:spPr>
+              <a:blipFill>
+                <a:blip r:embed="rId2"/>
+                <a:stretch>
+                  <a:fillRect l="-1871" t="-2078"/>
+                </a:stretch>
+              </a:blipFill>
+            </p:spPr>
+            <p:txBody>
+              <a:bodyPr/>
+              <a:lstStyle/>
+              <a:p>
+                <a:r>
+                  <a:rPr lang="en-DE">
+                    <a:noFill/>
+                  </a:rPr>
+                  <a:t> </a:t>
+                </a:r>
+              </a:p>
+            </p:txBody>
+          </p:sp>
+        </mc:Fallback>
+      </mc:AlternateContent>
+      <p:sp>
+        <p:nvSpPr>
+          <p:cNvPr id="4" name="Fußzeilenplatzhalter 3">
+            <a:extLst>
+              <a:ext uri="{FF2B5EF4-FFF2-40B4-BE49-F238E27FC236}">
+                <a16:creationId xmlns:a16="http://schemas.microsoft.com/office/drawing/2014/main" id="{DD53C672-D9F3-3ABF-A138-ED36C8AE3DE9}"/>
+              </a:ext>
+            </a:extLst>
+          </p:cNvPr>
+          <p:cNvSpPr>
+            <a:spLocks noGrp="1"/>
+          </p:cNvSpPr>
+          <p:nvPr>
+            <p:ph type="ftr" sz="quarter" idx="11"/>
+          </p:nvPr>
+        </p:nvSpPr>
+        <p:spPr/>
+        <p:txBody>
+          <a:bodyPr/>
+          <a:lstStyle/>
+          <a:p>
+            <a:r>
+              <a:rPr lang="de-DE"/>
+              <a:t>ALGuDS Aufgabe 2.5 Phil Hartmann, Fakultät Digitale Transformation</a:t>
+            </a:r>
+          </a:p>
+        </p:txBody>
+      </p:sp>
+      <p:sp>
+        <p:nvSpPr>
+          <p:cNvPr id="5" name="Rechteck 4">
+            <a:extLst>
+              <a:ext uri="{FF2B5EF4-FFF2-40B4-BE49-F238E27FC236}">
+                <a16:creationId xmlns:a16="http://schemas.microsoft.com/office/drawing/2014/main" id="{287F150B-5043-4FD6-40EF-39F5D5E8FFD9}"/>
+              </a:ext>
+            </a:extLst>
+          </p:cNvPr>
+          <p:cNvSpPr/>
+          <p:nvPr/>
+        </p:nvSpPr>
+        <p:spPr>
+          <a:xfrm>
+            <a:off x="5465036" y="1903418"/>
+            <a:ext cx="2679106" cy="435835"/>
+          </a:xfrm>
+          <a:prstGeom prst="rect">
+            <a:avLst/>
+          </a:prstGeom>
+          <a:noFill/>
+        </p:spPr>
+        <p:style>
+          <a:lnRef idx="2">
+            <a:schemeClr val="accent2"/>
+          </a:lnRef>
+          <a:fillRef idx="1">
+            <a:schemeClr val="lt1"/>
+          </a:fillRef>
+          <a:effectRef idx="0">
+            <a:schemeClr val="accent2"/>
+          </a:effectRef>
+          <a:fontRef idx="minor">
+            <a:schemeClr val="dk1"/>
+          </a:fontRef>
+        </p:style>
+        <p:txBody>
+          <a:bodyPr rtlCol="0" anchor="ctr"/>
+          <a:lstStyle/>
+          <a:p>
+            <a:pPr algn="ctr"/>
+            <a:endParaRPr lang="en-DE"/>
+          </a:p>
+        </p:txBody>
+      </p:sp>
+      <p:cxnSp>
+        <p:nvCxnSpPr>
+          <p:cNvPr id="9" name="Gerade Verbindung mit Pfeil 8">
+            <a:extLst>
+              <a:ext uri="{FF2B5EF4-FFF2-40B4-BE49-F238E27FC236}">
+                <a16:creationId xmlns:a16="http://schemas.microsoft.com/office/drawing/2014/main" id="{5B00FDD6-F07E-BE07-38EA-DB98EAAE4FD2}"/>
+              </a:ext>
+            </a:extLst>
+          </p:cNvPr>
+          <p:cNvCxnSpPr/>
+          <p:nvPr/>
+        </p:nvCxnSpPr>
+        <p:spPr>
+          <a:xfrm flipH="1">
+            <a:off x="8212509" y="2157811"/>
+            <a:ext cx="965674" cy="0"/>
+          </a:xfrm>
+          <a:prstGeom prst="straightConnector1">
+            <a:avLst/>
+          </a:prstGeom>
+          <a:ln>
+            <a:tailEnd type="triangle"/>
+          </a:ln>
+        </p:spPr>
+        <p:style>
+          <a:lnRef idx="1">
+            <a:schemeClr val="accent2"/>
+          </a:lnRef>
+          <a:fillRef idx="0">
+            <a:schemeClr val="accent2"/>
+          </a:fillRef>
+          <a:effectRef idx="0">
+            <a:schemeClr val="accent2"/>
+          </a:effectRef>
+          <a:fontRef idx="minor">
+            <a:schemeClr val="tx1"/>
+          </a:fontRef>
+        </p:style>
+      </p:cxnSp>
+      <p:sp>
+        <p:nvSpPr>
+          <p:cNvPr id="10" name="Textfeld 9">
+            <a:extLst>
+              <a:ext uri="{FF2B5EF4-FFF2-40B4-BE49-F238E27FC236}">
+                <a16:creationId xmlns:a16="http://schemas.microsoft.com/office/drawing/2014/main" id="{FB9D0E5A-F6AC-6C74-C2B4-E10F5A5D72BA}"/>
+              </a:ext>
+            </a:extLst>
+          </p:cNvPr>
+          <p:cNvSpPr txBox="1"/>
+          <p:nvPr/>
+        </p:nvSpPr>
+        <p:spPr>
+          <a:xfrm>
+            <a:off x="9326459" y="1960443"/>
+            <a:ext cx="1999716" cy="369332"/>
+          </a:xfrm>
+          <a:prstGeom prst="rect">
+            <a:avLst/>
+          </a:prstGeom>
+          <a:noFill/>
+        </p:spPr>
+        <p:txBody>
+          <a:bodyPr wrap="square" rtlCol="0">
+            <a:spAutoFit/>
+          </a:bodyPr>
+          <a:lstStyle/>
+          <a:p>
+            <a:r>
+              <a:rPr lang="en-GB" dirty="0">
+                <a:latin typeface="Aptos" panose="020B0004020202020204" pitchFamily="34" charset="0"/>
+              </a:rPr>
+              <a:t>Redundant</a:t>
+            </a:r>
+            <a:endParaRPr lang="en-DE" dirty="0">
+              <a:latin typeface="Aptos" panose="020B0004020202020204" pitchFamily="34" charset="0"/>
+            </a:endParaRPr>
+          </a:p>
+        </p:txBody>
+      </p:sp>
+    </p:spTree>
+    <p:extLst>
+      <p:ext uri="{BB962C8B-B14F-4D97-AF65-F5344CB8AC3E}">
+        <p14:creationId xmlns:p14="http://schemas.microsoft.com/office/powerpoint/2010/main" val="3788871640"/>
+      </p:ext>
+    </p:extLst>
+  </p:cSld>
+  <p:clrMapOvr>
+    <a:masterClrMapping/>
+  </p:clrMapOvr>
+  <p:timing>
+    <p:tnLst>
+      <p:par>
+        <p:cTn id="1" dur="indefinite" restart="never" nodeType="tmRoot">
+          <p:childTnLst>
+            <p:seq concurrent="1" nextAc="seek">
+              <p:cTn id="2" dur="indefinite" nodeType="mainSeq">
+                <p:childTnLst>
+                  <p:par>
+                    <p:cTn id="3" fill="hold">
+                      <p:stCondLst>
+                        <p:cond delay="indefinite"/>
+                      </p:stCondLst>
+                      <p:childTnLst>
+                        <p:par>
+                          <p:cTn id="4" fill="hold">
+                            <p:stCondLst>
+                              <p:cond delay="0"/>
+                            </p:stCondLst>
+                            <p:childTnLst>
+                              <p:par>
+                                <p:cTn id="5" presetID="1" presetClass="entr" presetSubtype="0" fill="hold" nodeType="clickEffect">
+                                  <p:stCondLst>
+                                    <p:cond delay="0"/>
+                                  </p:stCondLst>
+                                  <p:childTnLst>
+                                    <p:set>
+                                      <p:cBhvr>
+                                        <p:cTn id="6" dur="1" fill="hold">
+                                          <p:stCondLst>
+                                            <p:cond delay="0"/>
+                                          </p:stCondLst>
+                                        </p:cTn>
+                                        <p:tgtEl>
+                                          <p:spTgt spid="3">
+                                            <p:txEl>
+                                              <p:pRg st="0" end="0"/>
+                                            </p:txEl>
+                                          </p:spTgt>
+                                        </p:tgtEl>
+                                        <p:attrNameLst>
+                                          <p:attrName>style.visibility</p:attrName>
+                                        </p:attrNameLst>
+                                      </p:cBhvr>
+                                      <p:to>
+                                        <p:strVal val="visible"/>
+                                      </p:to>
+                                    </p:set>
+                                  </p:childTnLst>
+                                </p:cTn>
+                              </p:par>
+                            </p:childTnLst>
+                          </p:cTn>
+                        </p:par>
+                      </p:childTnLst>
+                    </p:cTn>
+                  </p:par>
+                  <p:par>
+                    <p:cTn id="7" fill="hold">
+                      <p:stCondLst>
+                        <p:cond delay="indefinite"/>
+                      </p:stCondLst>
+                      <p:childTnLst>
+                        <p:par>
+                          <p:cTn id="8" fill="hold">
+                            <p:stCondLst>
+                              <p:cond delay="0"/>
+                            </p:stCondLst>
+                            <p:childTnLst>
+                              <p:par>
+                                <p:cTn id="9" presetID="1" presetClass="entr" presetSubtype="0" fill="hold" nodeType="clickEffect">
+                                  <p:stCondLst>
+                                    <p:cond delay="0"/>
+                                  </p:stCondLst>
+                                  <p:childTnLst>
+                                    <p:set>
+                                      <p:cBhvr>
+                                        <p:cTn id="10" dur="1" fill="hold">
+                                          <p:stCondLst>
+                                            <p:cond delay="0"/>
+                                          </p:stCondLst>
+                                        </p:cTn>
+                                        <p:tgtEl>
+                                          <p:spTgt spid="3">
+                                            <p:txEl>
+                                              <p:pRg st="1" end="1"/>
+                                            </p:txEl>
+                                          </p:spTgt>
+                                        </p:tgtEl>
+                                        <p:attrNameLst>
+                                          <p:attrName>style.visibility</p:attrName>
+                                        </p:attrNameLst>
+                                      </p:cBhvr>
+                                      <p:to>
+                                        <p:strVal val="visible"/>
+                                      </p:to>
+                                    </p:set>
+                                  </p:childTnLst>
+                                </p:cTn>
+                              </p:par>
+                            </p:childTnLst>
+                          </p:cTn>
+                        </p:par>
+                      </p:childTnLst>
+                    </p:cTn>
+                  </p:par>
+                  <p:par>
+                    <p:cTn id="11" fill="hold">
+                      <p:stCondLst>
+                        <p:cond delay="indefinite"/>
+                      </p:stCondLst>
+                      <p:childTnLst>
+                        <p:par>
+                          <p:cTn id="12" fill="hold">
+                            <p:stCondLst>
+                              <p:cond delay="0"/>
+                            </p:stCondLst>
+                            <p:childTnLst>
+                              <p:par>
+                                <p:cTn id="13" presetID="1" presetClass="entr" presetSubtype="0" fill="hold" grpId="0" nodeType="clickEffect">
+                                  <p:stCondLst>
+                                    <p:cond delay="0"/>
+                                  </p:stCondLst>
+                                  <p:childTnLst>
+                                    <p:set>
+                                      <p:cBhvr>
+                                        <p:cTn id="14" dur="1" fill="hold">
+                                          <p:stCondLst>
+                                            <p:cond delay="0"/>
+                                          </p:stCondLst>
+                                        </p:cTn>
+                                        <p:tgtEl>
+                                          <p:spTgt spid="5"/>
+                                        </p:tgtEl>
+                                        <p:attrNameLst>
+                                          <p:attrName>style.visibility</p:attrName>
+                                        </p:attrNameLst>
+                                      </p:cBhvr>
+                                      <p:to>
+                                        <p:strVal val="visible"/>
+                                      </p:to>
+                                    </p:set>
+                                  </p:childTnLst>
+                                </p:cTn>
+                              </p:par>
+                              <p:par>
+                                <p:cTn id="15" presetID="1" presetClass="entr" presetSubtype="0" fill="hold" grpId="0" nodeType="withEffect">
+                                  <p:stCondLst>
+                                    <p:cond delay="0"/>
+                                  </p:stCondLst>
+                                  <p:childTnLst>
+                                    <p:set>
+                                      <p:cBhvr>
+                                        <p:cTn id="16" dur="1" fill="hold">
+                                          <p:stCondLst>
+                                            <p:cond delay="0"/>
+                                          </p:stCondLst>
+                                        </p:cTn>
+                                        <p:tgtEl>
+                                          <p:spTgt spid="10"/>
+                                        </p:tgtEl>
+                                        <p:attrNameLst>
+                                          <p:attrName>style.visibility</p:attrName>
+                                        </p:attrNameLst>
+                                      </p:cBhvr>
+                                      <p:to>
+                                        <p:strVal val="visible"/>
+                                      </p:to>
+                                    </p:set>
+                                  </p:childTnLst>
+                                </p:cTn>
+                              </p:par>
+                              <p:par>
+                                <p:cTn id="17" presetID="1" presetClass="entr" presetSubtype="0" fill="hold" nodeType="withEffect">
+                                  <p:stCondLst>
+                                    <p:cond delay="0"/>
+                                  </p:stCondLst>
+                                  <p:childTnLst>
+                                    <p:set>
+                                      <p:cBhvr>
+                                        <p:cTn id="18" dur="1" fill="hold">
+                                          <p:stCondLst>
+                                            <p:cond delay="0"/>
+                                          </p:stCondLst>
+                                        </p:cTn>
+                                        <p:tgtEl>
+                                          <p:spTgt spid="9"/>
+                                        </p:tgtEl>
+                                        <p:attrNameLst>
+                                          <p:attrName>style.visibility</p:attrName>
+                                        </p:attrNameLst>
+                                      </p:cBhvr>
+                                      <p:to>
+                                        <p:strVal val="visible"/>
+                                      </p:to>
+                                    </p:set>
+                                  </p:childTnLst>
+                                </p:cTn>
+                              </p:par>
+                            </p:childTnLst>
+                          </p:cTn>
+                        </p:par>
+                      </p:childTnLst>
+                    </p:cTn>
+                  </p:par>
+                  <p:par>
+                    <p:cTn id="19" fill="hold">
+                      <p:stCondLst>
+                        <p:cond delay="indefinite"/>
+                      </p:stCondLst>
+                      <p:childTnLst>
+                        <p:par>
+                          <p:cTn id="20" fill="hold">
+                            <p:stCondLst>
+                              <p:cond delay="0"/>
+                            </p:stCondLst>
+                            <p:childTnLst>
+                              <p:par>
+                                <p:cTn id="21" presetID="1" presetClass="entr" presetSubtype="0" fill="hold" nodeType="clickEffect">
+                                  <p:stCondLst>
+                                    <p:cond delay="0"/>
+                                  </p:stCondLst>
+                                  <p:childTnLst>
+                                    <p:set>
+                                      <p:cBhvr>
+                                        <p:cTn id="22" dur="1" fill="hold">
+                                          <p:stCondLst>
+                                            <p:cond delay="0"/>
+                                          </p:stCondLst>
+                                        </p:cTn>
+                                        <p:tgtEl>
+                                          <p:spTgt spid="3">
+                                            <p:txEl>
+                                              <p:pRg st="2" end="2"/>
+                                            </p:txEl>
+                                          </p:spTgt>
+                                        </p:tgtEl>
+                                        <p:attrNameLst>
+                                          <p:attrName>style.visibility</p:attrName>
+                                        </p:attrNameLst>
+                                      </p:cBhvr>
+                                      <p:to>
+                                        <p:strVal val="visible"/>
+                                      </p:to>
+                                    </p:set>
+                                  </p:childTnLst>
+                                </p:cTn>
+                              </p:par>
+                            </p:childTnLst>
+                          </p:cTn>
+                        </p:par>
+                      </p:childTnLst>
+                    </p:cTn>
+                  </p:par>
+                  <p:par>
+                    <p:cTn id="23" fill="hold">
+                      <p:stCondLst>
+                        <p:cond delay="indefinite"/>
+                      </p:stCondLst>
+                      <p:childTnLst>
+                        <p:par>
+                          <p:cTn id="24" fill="hold">
+                            <p:stCondLst>
+                              <p:cond delay="0"/>
+                            </p:stCondLst>
+                            <p:childTnLst>
+                              <p:par>
+                                <p:cTn id="25" presetID="1" presetClass="entr" presetSubtype="0" fill="hold" nodeType="clickEffect">
+                                  <p:stCondLst>
+                                    <p:cond delay="0"/>
+                                  </p:stCondLst>
+                                  <p:childTnLst>
+                                    <p:set>
+                                      <p:cBhvr>
+                                        <p:cTn id="26" dur="1" fill="hold">
+                                          <p:stCondLst>
+                                            <p:cond delay="0"/>
+                                          </p:stCondLst>
+                                        </p:cTn>
+                                        <p:tgtEl>
+                                          <p:spTgt spid="3">
+                                            <p:txEl>
+                                              <p:pRg st="3" end="3"/>
+                                            </p:txEl>
+                                          </p:spTgt>
+                                        </p:tgtEl>
+                                        <p:attrNameLst>
+                                          <p:attrName>style.visibility</p:attrName>
+                                        </p:attrNameLst>
+                                      </p:cBhvr>
+                                      <p:to>
+                                        <p:strVal val="visible"/>
+                                      </p:to>
+                                    </p:set>
+                                  </p:childTnLst>
+                                </p:cTn>
+                              </p:par>
+                            </p:childTnLst>
+                          </p:cTn>
+                        </p:par>
+                      </p:childTnLst>
+                    </p:cTn>
+                  </p:par>
+                  <p:par>
+                    <p:cTn id="27" fill="hold">
+                      <p:stCondLst>
+                        <p:cond delay="indefinite"/>
+                      </p:stCondLst>
+                      <p:childTnLst>
+                        <p:par>
+                          <p:cTn id="28" fill="hold">
+                            <p:stCondLst>
+                              <p:cond delay="0"/>
+                            </p:stCondLst>
+                            <p:childTnLst>
+                              <p:par>
+                                <p:cTn id="29" presetID="1" presetClass="entr" presetSubtype="0" fill="hold" nodeType="clickEffect">
+                                  <p:stCondLst>
+                                    <p:cond delay="0"/>
+                                  </p:stCondLst>
+                                  <p:childTnLst>
+                                    <p:set>
+                                      <p:cBhvr>
+                                        <p:cTn id="30" dur="1" fill="hold">
+                                          <p:stCondLst>
+                                            <p:cond delay="0"/>
+                                          </p:stCondLst>
+                                        </p:cTn>
+                                        <p:tgtEl>
+                                          <p:spTgt spid="3">
+                                            <p:txEl>
+                                              <p:pRg st="4" end="4"/>
+                                            </p:txEl>
+                                          </p:spTgt>
+                                        </p:tgtEl>
+                                        <p:attrNameLst>
+                                          <p:attrName>style.visibility</p:attrName>
+                                        </p:attrNameLst>
+                                      </p:cBhvr>
+                                      <p:to>
+                                        <p:strVal val="visible"/>
+                                      </p:to>
+                                    </p:set>
+                                  </p:childTnLst>
+                                </p:cTn>
+                              </p:par>
+                            </p:childTnLst>
+                          </p:cTn>
+                        </p:par>
+                      </p:childTnLst>
+                    </p:cTn>
+                  </p:par>
+                </p:childTnLst>
+              </p:cTn>
+              <p:prevCondLst>
+                <p:cond evt="onPrev" delay="0">
+                  <p:tgtEl>
+                    <p:sldTgt/>
+                  </p:tgtEl>
+                </p:cond>
+              </p:prevCondLst>
+              <p:nextCondLst>
+                <p:cond evt="onNext" delay="0">
+                  <p:tgtEl>
+                    <p:sldTgt/>
+                  </p:tgtEl>
+                </p:cond>
+              </p:nextCondLst>
+            </p:seq>
+          </p:childTnLst>
+        </p:cTn>
+      </p:par>
+    </p:tnLst>
+    <p:bldLst>
+      <p:bldP spid="5" grpId="0" animBg="1"/>
+      <p:bldP spid="10" grpId="0"/>
+    </p:bldLst>
+  </p:timing>
+</p:sld>
+</file>
+
+<file path=ppt/slides/slide6.xml><?xml version="1.0" encoding="utf-8"?>
 <p:sld xmlns:a="http://schemas.openxmlformats.org/drawingml/2006/main" xmlns:r="http://schemas.openxmlformats.org/officeDocument/2006/relationships" xmlns:p="http://schemas.openxmlformats.org/presentationml/2006/main">
   <p:cSld>
     <p:spTree>
@@ -11486,7 +12278,7 @@
 </p:sld>
 </file>
 
-<file path=ppt/slides/slide6.xml><?xml version="1.0" encoding="utf-8"?>
+<file path=ppt/slides/slide7.xml><?xml version="1.0" encoding="utf-8"?>
 <p:sld xmlns:a="http://schemas.openxmlformats.org/drawingml/2006/main" xmlns:r="http://schemas.openxmlformats.org/officeDocument/2006/relationships" xmlns:p="http://schemas.openxmlformats.org/presentationml/2006/main">
   <p:cSld>
     <p:spTree>
@@ -11668,7 +12460,7 @@
 </p:sld>
 </file>
 
-<file path=ppt/slides/slide7.xml><?xml version="1.0" encoding="utf-8"?>
+<file path=ppt/slides/slide8.xml><?xml version="1.0" encoding="utf-8"?>
 <p:sld xmlns:a="http://schemas.openxmlformats.org/drawingml/2006/main" xmlns:r="http://schemas.openxmlformats.org/officeDocument/2006/relationships" xmlns:p="http://schemas.openxmlformats.org/presentationml/2006/main">
   <p:cSld>
     <p:spTree>

</xml_diff>